<commit_message>
Requirements use cases gemaakt
</commit_message>
<xml_diff>
--- a/Documenten/designPoker.pptx
+++ b/Documenten/designPoker.pptx
@@ -117,13 +117,28 @@
 <pc:chgInfo xmlns:a="http://schemas.openxmlformats.org/drawingml/2006/main" xmlns:r="http://schemas.openxmlformats.org/officeDocument/2006/relationships" xmlns:ac="http://schemas.microsoft.com/office/drawing/2013/main/command" xmlns:pc="http://schemas.microsoft.com/office/powerpoint/2013/main/command">
   <pc:docChgLst>
     <pc:chgData name="Christian Malipaard" userId="0451abdb30c1cde2" providerId="LiveId" clId="{9E04D6A9-2638-4119-ABA1-BB3904254A9F}"/>
-    <pc:docChg chg="modSld">
-      <pc:chgData name="Christian Malipaard" userId="0451abdb30c1cde2" providerId="LiveId" clId="{9E04D6A9-2638-4119-ABA1-BB3904254A9F}" dt="2018-03-16T11:11:35.910" v="2" actId="20577"/>
+    <pc:docChg chg="undo modSld">
+      <pc:chgData name="Christian Malipaard" userId="0451abdb30c1cde2" providerId="LiveId" clId="{9E04D6A9-2638-4119-ABA1-BB3904254A9F}" dt="2018-03-16T12:00:36.446" v="9" actId="20577"/>
       <pc:docMkLst>
         <pc:docMk/>
       </pc:docMkLst>
+      <pc:sldChg chg="modSp">
+        <pc:chgData name="Christian Malipaard" userId="0451abdb30c1cde2" providerId="LiveId" clId="{9E04D6A9-2638-4119-ABA1-BB3904254A9F}" dt="2018-03-16T12:00:36.446" v="9" actId="20577"/>
+        <pc:sldMkLst>
+          <pc:docMk/>
+          <pc:sldMk cId="2378086893" sldId="256"/>
+        </pc:sldMkLst>
+        <pc:spChg chg="mod">
+          <ac:chgData name="Christian Malipaard" userId="0451abdb30c1cde2" providerId="LiveId" clId="{9E04D6A9-2638-4119-ABA1-BB3904254A9F}" dt="2018-03-16T12:00:36.446" v="9" actId="20577"/>
+          <ac:spMkLst>
+            <pc:docMk/>
+            <pc:sldMk cId="2378086893" sldId="256"/>
+            <ac:spMk id="9" creationId="{AF2EA81F-867C-41A3-B38A-98708B7D4577}"/>
+          </ac:spMkLst>
+        </pc:spChg>
+      </pc:sldChg>
       <pc:sldChg chg="addSp modSp">
-        <pc:chgData name="Christian Malipaard" userId="0451abdb30c1cde2" providerId="LiveId" clId="{9E04D6A9-2638-4119-ABA1-BB3904254A9F}" dt="2018-03-16T11:11:35.910" v="2" actId="20577"/>
+        <pc:chgData name="Christian Malipaard" userId="0451abdb30c1cde2" providerId="LiveId" clId="{9E04D6A9-2638-4119-ABA1-BB3904254A9F}" dt="2018-03-16T12:00:19.869" v="5" actId="20577"/>
         <pc:sldMkLst>
           <pc:docMk/>
           <pc:sldMk cId="1565356963" sldId="257"/>
@@ -134,6 +149,14 @@
             <pc:docMk/>
             <pc:sldMk cId="1565356963" sldId="257"/>
             <ac:spMk id="2" creationId="{7BFCC722-EABD-4997-83D5-0909FD8F9FB0}"/>
+          </ac:spMkLst>
+        </pc:spChg>
+        <pc:spChg chg="mod">
+          <ac:chgData name="Christian Malipaard" userId="0451abdb30c1cde2" providerId="LiveId" clId="{9E04D6A9-2638-4119-ABA1-BB3904254A9F}" dt="2018-03-16T12:00:19.869" v="5" actId="20577"/>
+          <ac:spMkLst>
+            <pc:docMk/>
+            <pc:sldMk cId="1565356963" sldId="257"/>
+            <ac:spMk id="10" creationId="{29F59065-FF5A-46F8-B9AA-1B87D75DED5E}"/>
           </ac:spMkLst>
         </pc:spChg>
       </pc:sldChg>
@@ -3496,7 +3519,7 @@
                   <a:schemeClr val="accent2"/>
                 </a:solidFill>
               </a:rPr>
-              <a:t>		 login | register | profile</a:t>
+              <a:t>			 login | register</a:t>
             </a:r>
             <a:endParaRPr lang="nl-NL" dirty="0">
               <a:solidFill>
@@ -4892,7 +4915,7 @@
                   <a:schemeClr val="accent2"/>
                 </a:solidFill>
               </a:rPr>
-              <a:t>		 login | register | profile</a:t>
+              <a:t>		 		profile</a:t>
             </a:r>
             <a:endParaRPr lang="nl-NL" dirty="0">
               <a:solidFill>

</xml_diff>